<commit_message>
Added Robot Day Compressed
</commit_message>
<xml_diff>
--- a/docs/Robot-Day.pptx
+++ b/docs/Robot-Day.pptx
@@ -3682,7 +3682,13 @@
           <p:nvPr/>
         </p:nvPicPr>
         <p:blipFill>
-          <a:blip r:embed="rId10"/>
+          <a:blip r:embed="rId10" cstate="print">
+            <a:extLst>
+              <a:ext uri="{28A0092B-C50C-407E-A947-70E740481C1C}">
+                <a14:useLocalDpi xmlns:a14="http://schemas.microsoft.com/office/drawing/2010/main"/>
+              </a:ext>
+            </a:extLst>
+          </a:blip>
           <a:stretch>
             <a:fillRect/>
           </a:stretch>

</xml_diff>